<commit_message>
upload a new files
</commit_message>
<xml_diff>
--- a/Interface/INTERFACE.pptx
+++ b/Interface/INTERFACE.pptx
@@ -181,7 +181,7 @@
           <a:noFill/>
           <a:extLst>
             <a:ext uri="{909E8E84-426E-40dd-AFC4-6F175D3DCCD1}">
-              <a14:hiddenFill xmlns:a14="http://schemas.microsoft.com/office/drawing/2010/main" xmlns="">
+              <a14:hiddenFill xmlns="" xmlns:a14="http://schemas.microsoft.com/office/drawing/2010/main">
                 <a:solidFill>
                   <a:srgbClr val="FFFFFF"/>
                 </a:solidFill>
@@ -240,7 +240,7 @@
             </a:ln>
             <a:extLst>
               <a:ext uri="{91240B29-F687-4f45-9708-019B960494DF}">
-                <a14:hiddenLine xmlns:a14="http://schemas.microsoft.com/office/drawing/2010/main" xmlns="" w="9525">
+                <a14:hiddenLine xmlns="" xmlns:a14="http://schemas.microsoft.com/office/drawing/2010/main" w="9525">
                   <a:solidFill>
                     <a:srgbClr val="000000"/>
                   </a:solidFill>
@@ -330,7 +330,7 @@
             </a:ln>
             <a:extLst>
               <a:ext uri="{91240B29-F687-4f45-9708-019B960494DF}">
-                <a14:hiddenLine xmlns:a14="http://schemas.microsoft.com/office/drawing/2010/main" xmlns="" w="9525">
+                <a14:hiddenLine xmlns="" xmlns:a14="http://schemas.microsoft.com/office/drawing/2010/main" w="9525">
                   <a:solidFill>
                     <a:srgbClr val="000000"/>
                   </a:solidFill>
@@ -420,7 +420,7 @@
             </a:ln>
             <a:extLst>
               <a:ext uri="{91240B29-F687-4f45-9708-019B960494DF}">
-                <a14:hiddenLine xmlns:a14="http://schemas.microsoft.com/office/drawing/2010/main" xmlns="" w="9525">
+                <a14:hiddenLine xmlns="" xmlns:a14="http://schemas.microsoft.com/office/drawing/2010/main" w="9525">
                   <a:solidFill>
                     <a:srgbClr val="000000"/>
                   </a:solidFill>
@@ -454,7 +454,7 @@
             </a:ln>
             <a:extLst>
               <a:ext uri="{91240B29-F687-4f45-9708-019B960494DF}">
-                <a14:hiddenLine xmlns:a14="http://schemas.microsoft.com/office/drawing/2010/main" xmlns="" w="9525">
+                <a14:hiddenLine xmlns="" xmlns:a14="http://schemas.microsoft.com/office/drawing/2010/main" w="9525">
                   <a:solidFill>
                     <a:srgbClr val="000000"/>
                   </a:solidFill>
@@ -544,7 +544,7 @@
             </a:ln>
             <a:extLst>
               <a:ext uri="{91240B29-F687-4f45-9708-019B960494DF}">
-                <a14:hiddenLine xmlns:a14="http://schemas.microsoft.com/office/drawing/2010/main" xmlns="" w="9525">
+                <a14:hiddenLine xmlns="" xmlns:a14="http://schemas.microsoft.com/office/drawing/2010/main" w="9525">
                   <a:solidFill>
                     <a:srgbClr val="000000"/>
                   </a:solidFill>
@@ -606,7 +606,7 @@
             </a:ln>
             <a:extLst>
               <a:ext uri="{91240B29-F687-4f45-9708-019B960494DF}">
-                <a14:hiddenLine xmlns:a14="http://schemas.microsoft.com/office/drawing/2010/main" xmlns="" w="9525">
+                <a14:hiddenLine xmlns="" xmlns:a14="http://schemas.microsoft.com/office/drawing/2010/main" w="9525">
                   <a:solidFill>
                     <a:srgbClr val="000000"/>
                   </a:solidFill>
@@ -668,7 +668,7 @@
             </a:ln>
             <a:extLst>
               <a:ext uri="{91240B29-F687-4f45-9708-019B960494DF}">
-                <a14:hiddenLine xmlns:a14="http://schemas.microsoft.com/office/drawing/2010/main" xmlns="" w="9525">
+                <a14:hiddenLine xmlns="" xmlns:a14="http://schemas.microsoft.com/office/drawing/2010/main" w="9525">
                   <a:solidFill>
                     <a:srgbClr val="000000"/>
                   </a:solidFill>
@@ -758,7 +758,7 @@
             </a:ln>
             <a:extLst>
               <a:ext uri="{91240B29-F687-4f45-9708-019B960494DF}">
-                <a14:hiddenLine xmlns:a14="http://schemas.microsoft.com/office/drawing/2010/main" xmlns="" w="9525">
+                <a14:hiddenLine xmlns="" xmlns:a14="http://schemas.microsoft.com/office/drawing/2010/main" w="9525">
                   <a:solidFill>
                     <a:srgbClr val="000000"/>
                   </a:solidFill>
@@ -820,7 +820,7 @@
             </a:ln>
             <a:extLst>
               <a:ext uri="{91240B29-F687-4f45-9708-019B960494DF}">
-                <a14:hiddenLine xmlns:a14="http://schemas.microsoft.com/office/drawing/2010/main" xmlns="" w="9525">
+                <a14:hiddenLine xmlns="" xmlns:a14="http://schemas.microsoft.com/office/drawing/2010/main" w="9525">
                   <a:solidFill>
                     <a:srgbClr val="000000"/>
                   </a:solidFill>
@@ -882,7 +882,7 @@
             </a:ln>
             <a:extLst>
               <a:ext uri="{91240B29-F687-4f45-9708-019B960494DF}">
-                <a14:hiddenLine xmlns:a14="http://schemas.microsoft.com/office/drawing/2010/main" xmlns="" w="9525">
+                <a14:hiddenLine xmlns="" xmlns:a14="http://schemas.microsoft.com/office/drawing/2010/main" w="9525">
                   <a:solidFill>
                     <a:srgbClr val="000000"/>
                   </a:solidFill>
@@ -972,7 +972,7 @@
             </a:ln>
             <a:extLst>
               <a:ext uri="{91240B29-F687-4f45-9708-019B960494DF}">
-                <a14:hiddenLine xmlns:a14="http://schemas.microsoft.com/office/drawing/2010/main" xmlns="" w="9525">
+                <a14:hiddenLine xmlns="" xmlns:a14="http://schemas.microsoft.com/office/drawing/2010/main" w="9525">
                   <a:solidFill>
                     <a:srgbClr val="000000"/>
                   </a:solidFill>
@@ -1062,7 +1062,7 @@
             </a:ln>
             <a:extLst>
               <a:ext uri="{91240B29-F687-4f45-9708-019B960494DF}">
-                <a14:hiddenLine xmlns:a14="http://schemas.microsoft.com/office/drawing/2010/main" xmlns="" w="9525">
+                <a14:hiddenLine xmlns="" xmlns:a14="http://schemas.microsoft.com/office/drawing/2010/main" w="9525">
                   <a:solidFill>
                     <a:srgbClr val="000000"/>
                   </a:solidFill>
@@ -1124,7 +1124,7 @@
             </a:ln>
             <a:extLst>
               <a:ext uri="{91240B29-F687-4f45-9708-019B960494DF}">
-                <a14:hiddenLine xmlns:a14="http://schemas.microsoft.com/office/drawing/2010/main" xmlns="" w="9525">
+                <a14:hiddenLine xmlns="" xmlns:a14="http://schemas.microsoft.com/office/drawing/2010/main" w="9525">
                   <a:solidFill>
                     <a:srgbClr val="000000"/>
                   </a:solidFill>
@@ -1234,7 +1234,7 @@
             </a:ln>
             <a:extLst>
               <a:ext uri="{91240B29-F687-4f45-9708-019B960494DF}">
-                <a14:hiddenLine xmlns:a14="http://schemas.microsoft.com/office/drawing/2010/main" xmlns="" w="9525">
+                <a14:hiddenLine xmlns="" xmlns:a14="http://schemas.microsoft.com/office/drawing/2010/main" w="9525">
                   <a:solidFill>
                     <a:srgbClr val="000000"/>
                   </a:solidFill>
@@ -1296,7 +1296,7 @@
             </a:ln>
             <a:extLst>
               <a:ext uri="{91240B29-F687-4f45-9708-019B960494DF}">
-                <a14:hiddenLine xmlns:a14="http://schemas.microsoft.com/office/drawing/2010/main" xmlns="" w="9525">
+                <a14:hiddenLine xmlns="" xmlns:a14="http://schemas.microsoft.com/office/drawing/2010/main" w="9525">
                   <a:solidFill>
                     <a:srgbClr val="000000"/>
                   </a:solidFill>
@@ -1386,7 +1386,7 @@
             </a:ln>
             <a:extLst>
               <a:ext uri="{91240B29-F687-4f45-9708-019B960494DF}">
-                <a14:hiddenLine xmlns:a14="http://schemas.microsoft.com/office/drawing/2010/main" xmlns="" w="9525">
+                <a14:hiddenLine xmlns="" xmlns:a14="http://schemas.microsoft.com/office/drawing/2010/main" w="9525">
                   <a:solidFill>
                     <a:srgbClr val="000000"/>
                   </a:solidFill>
@@ -1476,7 +1476,7 @@
             </a:ln>
             <a:extLst>
               <a:ext uri="{91240B29-F687-4f45-9708-019B960494DF}">
-                <a14:hiddenLine xmlns:a14="http://schemas.microsoft.com/office/drawing/2010/main" xmlns="" w="9525">
+                <a14:hiddenLine xmlns="" xmlns:a14="http://schemas.microsoft.com/office/drawing/2010/main" w="9525">
                   <a:solidFill>
                     <a:srgbClr val="000000"/>
                   </a:solidFill>
@@ -1538,7 +1538,7 @@
             </a:ln>
             <a:extLst>
               <a:ext uri="{91240B29-F687-4f45-9708-019B960494DF}">
-                <a14:hiddenLine xmlns:a14="http://schemas.microsoft.com/office/drawing/2010/main" xmlns="" w="9525">
+                <a14:hiddenLine xmlns="" xmlns:a14="http://schemas.microsoft.com/office/drawing/2010/main" w="9525">
                   <a:solidFill>
                     <a:srgbClr val="000000"/>
                   </a:solidFill>
@@ -1628,7 +1628,7 @@
             </a:ln>
             <a:extLst>
               <a:ext uri="{91240B29-F687-4f45-9708-019B960494DF}">
-                <a14:hiddenLine xmlns:a14="http://schemas.microsoft.com/office/drawing/2010/main" xmlns="" w="9525">
+                <a14:hiddenLine xmlns="" xmlns:a14="http://schemas.microsoft.com/office/drawing/2010/main" w="9525">
                   <a:solidFill>
                     <a:srgbClr val="000000"/>
                   </a:solidFill>
@@ -1718,7 +1718,7 @@
             </a:ln>
             <a:extLst>
               <a:ext uri="{91240B29-F687-4f45-9708-019B960494DF}">
-                <a14:hiddenLine xmlns:a14="http://schemas.microsoft.com/office/drawing/2010/main" xmlns="" w="9525">
+                <a14:hiddenLine xmlns="" xmlns:a14="http://schemas.microsoft.com/office/drawing/2010/main" w="9525">
                   <a:solidFill>
                     <a:srgbClr val="000000"/>
                   </a:solidFill>
@@ -1774,7 +1774,7 @@
             </a:ln>
             <a:extLst>
               <a:ext uri="{91240B29-F687-4f45-9708-019B960494DF}">
-                <a14:hiddenLine xmlns:a14="http://schemas.microsoft.com/office/drawing/2010/main" xmlns="" w="9525">
+                <a14:hiddenLine xmlns="" xmlns:a14="http://schemas.microsoft.com/office/drawing/2010/main" w="9525">
                   <a:solidFill>
                     <a:srgbClr val="000000"/>
                   </a:solidFill>
@@ -1864,7 +1864,7 @@
             </a:ln>
             <a:extLst>
               <a:ext uri="{91240B29-F687-4f45-9708-019B960494DF}">
-                <a14:hiddenLine xmlns:a14="http://schemas.microsoft.com/office/drawing/2010/main" xmlns="" w="9525">
+                <a14:hiddenLine xmlns="" xmlns:a14="http://schemas.microsoft.com/office/drawing/2010/main" w="9525">
                   <a:solidFill>
                     <a:srgbClr val="000000"/>
                   </a:solidFill>
@@ -1920,7 +1920,7 @@
             </a:ln>
             <a:extLst>
               <a:ext uri="{91240B29-F687-4f45-9708-019B960494DF}">
-                <a14:hiddenLine xmlns:a14="http://schemas.microsoft.com/office/drawing/2010/main" xmlns="" w="9525">
+                <a14:hiddenLine xmlns="" xmlns:a14="http://schemas.microsoft.com/office/drawing/2010/main" w="9525">
                   <a:solidFill>
                     <a:srgbClr val="000000"/>
                   </a:solidFill>
@@ -2010,7 +2010,7 @@
             </a:ln>
             <a:extLst>
               <a:ext uri="{91240B29-F687-4f45-9708-019B960494DF}">
-                <a14:hiddenLine xmlns:a14="http://schemas.microsoft.com/office/drawing/2010/main" xmlns="" w="9525">
+                <a14:hiddenLine xmlns="" xmlns:a14="http://schemas.microsoft.com/office/drawing/2010/main" w="9525">
                   <a:solidFill>
                     <a:srgbClr val="000000"/>
                   </a:solidFill>
@@ -2078,7 +2078,7 @@
             </a:ln>
             <a:extLst>
               <a:ext uri="{91240B29-F687-4f45-9708-019B960494DF}">
-                <a14:hiddenLine xmlns:a14="http://schemas.microsoft.com/office/drawing/2010/main" xmlns="" w="9525">
+                <a14:hiddenLine xmlns="" xmlns:a14="http://schemas.microsoft.com/office/drawing/2010/main" w="9525">
                   <a:solidFill>
                     <a:srgbClr val="000000"/>
                   </a:solidFill>
@@ -2168,7 +2168,7 @@
             </a:ln>
             <a:extLst>
               <a:ext uri="{91240B29-F687-4f45-9708-019B960494DF}">
-                <a14:hiddenLine xmlns:a14="http://schemas.microsoft.com/office/drawing/2010/main" xmlns="" w="9525">
+                <a14:hiddenLine xmlns="" xmlns:a14="http://schemas.microsoft.com/office/drawing/2010/main" w="9525">
                   <a:solidFill>
                     <a:srgbClr val="000000"/>
                   </a:solidFill>
@@ -2236,7 +2236,7 @@
             </a:ln>
             <a:extLst>
               <a:ext uri="{91240B29-F687-4f45-9708-019B960494DF}">
-                <a14:hiddenLine xmlns:a14="http://schemas.microsoft.com/office/drawing/2010/main" xmlns="" w="9525">
+                <a14:hiddenLine xmlns="" xmlns:a14="http://schemas.microsoft.com/office/drawing/2010/main" w="9525">
                   <a:solidFill>
                     <a:srgbClr val="000000"/>
                   </a:solidFill>
@@ -2326,7 +2326,7 @@
             </a:ln>
             <a:extLst>
               <a:ext uri="{91240B29-F687-4f45-9708-019B960494DF}">
-                <a14:hiddenLine xmlns:a14="http://schemas.microsoft.com/office/drawing/2010/main" xmlns="" w="9525">
+                <a14:hiddenLine xmlns="" xmlns:a14="http://schemas.microsoft.com/office/drawing/2010/main" w="9525">
                   <a:solidFill>
                     <a:srgbClr val="000000"/>
                   </a:solidFill>
@@ -2360,7 +2360,7 @@
             </a:ln>
             <a:extLst>
               <a:ext uri="{91240B29-F687-4f45-9708-019B960494DF}">
-                <a14:hiddenLine xmlns:a14="http://schemas.microsoft.com/office/drawing/2010/main" xmlns="" w="9525">
+                <a14:hiddenLine xmlns="" xmlns:a14="http://schemas.microsoft.com/office/drawing/2010/main" w="9525">
                   <a:solidFill>
                     <a:srgbClr val="000000"/>
                   </a:solidFill>
@@ -2450,7 +2450,7 @@
             </a:ln>
             <a:extLst>
               <a:ext uri="{91240B29-F687-4f45-9708-019B960494DF}">
-                <a14:hiddenLine xmlns:a14="http://schemas.microsoft.com/office/drawing/2010/main" xmlns="" w="9525">
+                <a14:hiddenLine xmlns="" xmlns:a14="http://schemas.microsoft.com/office/drawing/2010/main" w="9525">
                   <a:solidFill>
                     <a:srgbClr val="000000"/>
                   </a:solidFill>
@@ -2512,7 +2512,7 @@
             </a:ln>
             <a:extLst>
               <a:ext uri="{91240B29-F687-4f45-9708-019B960494DF}">
-                <a14:hiddenLine xmlns:a14="http://schemas.microsoft.com/office/drawing/2010/main" xmlns="" w="9525">
+                <a14:hiddenLine xmlns="" xmlns:a14="http://schemas.microsoft.com/office/drawing/2010/main" w="9525">
                   <a:solidFill>
                     <a:srgbClr val="000000"/>
                   </a:solidFill>
@@ -2574,7 +2574,7 @@
             </a:ln>
             <a:extLst>
               <a:ext uri="{91240B29-F687-4f45-9708-019B960494DF}">
-                <a14:hiddenLine xmlns:a14="http://schemas.microsoft.com/office/drawing/2010/main" xmlns="" w="9525">
+                <a14:hiddenLine xmlns="" xmlns:a14="http://schemas.microsoft.com/office/drawing/2010/main" w="9525">
                   <a:solidFill>
                     <a:srgbClr val="000000"/>
                   </a:solidFill>
@@ -2664,7 +2664,7 @@
             </a:ln>
             <a:extLst>
               <a:ext uri="{91240B29-F687-4f45-9708-019B960494DF}">
-                <a14:hiddenLine xmlns:a14="http://schemas.microsoft.com/office/drawing/2010/main" xmlns="" w="9525">
+                <a14:hiddenLine xmlns="" xmlns:a14="http://schemas.microsoft.com/office/drawing/2010/main" w="9525">
                   <a:solidFill>
                     <a:srgbClr val="000000"/>
                   </a:solidFill>
@@ -2732,7 +2732,7 @@
             </a:ln>
             <a:extLst>
               <a:ext uri="{91240B29-F687-4f45-9708-019B960494DF}">
-                <a14:hiddenLine xmlns:a14="http://schemas.microsoft.com/office/drawing/2010/main" xmlns="" w="9525">
+                <a14:hiddenLine xmlns="" xmlns:a14="http://schemas.microsoft.com/office/drawing/2010/main" w="9525">
                   <a:solidFill>
                     <a:srgbClr val="000000"/>
                   </a:solidFill>
@@ -2794,7 +2794,7 @@
             </a:ln>
             <a:extLst>
               <a:ext uri="{91240B29-F687-4f45-9708-019B960494DF}">
-                <a14:hiddenLine xmlns:a14="http://schemas.microsoft.com/office/drawing/2010/main" xmlns="" w="9525">
+                <a14:hiddenLine xmlns="" xmlns:a14="http://schemas.microsoft.com/office/drawing/2010/main" w="9525">
                   <a:solidFill>
                     <a:srgbClr val="000000"/>
                   </a:solidFill>
@@ -2884,7 +2884,7 @@
             </a:ln>
             <a:extLst>
               <a:ext uri="{91240B29-F687-4f45-9708-019B960494DF}">
-                <a14:hiddenLine xmlns:a14="http://schemas.microsoft.com/office/drawing/2010/main" xmlns="" w="9525">
+                <a14:hiddenLine xmlns="" xmlns:a14="http://schemas.microsoft.com/office/drawing/2010/main" w="9525">
                   <a:solidFill>
                     <a:srgbClr val="000000"/>
                   </a:solidFill>
@@ -2946,7 +2946,7 @@
             </a:ln>
             <a:extLst>
               <a:ext uri="{91240B29-F687-4f45-9708-019B960494DF}">
-                <a14:hiddenLine xmlns:a14="http://schemas.microsoft.com/office/drawing/2010/main" xmlns="" w="9525">
+                <a14:hiddenLine xmlns="" xmlns:a14="http://schemas.microsoft.com/office/drawing/2010/main" w="9525">
                   <a:solidFill>
                     <a:srgbClr val="000000"/>
                   </a:solidFill>
@@ -3036,7 +3036,7 @@
             </a:ln>
             <a:extLst>
               <a:ext uri="{91240B29-F687-4f45-9708-019B960494DF}">
-                <a14:hiddenLine xmlns:a14="http://schemas.microsoft.com/office/drawing/2010/main" xmlns="" w="9525">
+                <a14:hiddenLine xmlns="" xmlns:a14="http://schemas.microsoft.com/office/drawing/2010/main" w="9525">
                   <a:solidFill>
                     <a:srgbClr val="000000"/>
                   </a:solidFill>
@@ -3098,7 +3098,7 @@
             </a:ln>
             <a:extLst>
               <a:ext uri="{91240B29-F687-4f45-9708-019B960494DF}">
-                <a14:hiddenLine xmlns:a14="http://schemas.microsoft.com/office/drawing/2010/main" xmlns="" w="9525">
+                <a14:hiddenLine xmlns="" xmlns:a14="http://schemas.microsoft.com/office/drawing/2010/main" w="9525">
                   <a:solidFill>
                     <a:srgbClr val="000000"/>
                   </a:solidFill>
@@ -3188,7 +3188,7 @@
             </a:ln>
             <a:extLst>
               <a:ext uri="{91240B29-F687-4f45-9708-019B960494DF}">
-                <a14:hiddenLine xmlns:a14="http://schemas.microsoft.com/office/drawing/2010/main" xmlns="" w="9525">
+                <a14:hiddenLine xmlns="" xmlns:a14="http://schemas.microsoft.com/office/drawing/2010/main" w="9525">
                   <a:solidFill>
                     <a:srgbClr val="000000"/>
                   </a:solidFill>
@@ -3222,7 +3222,7 @@
             </a:ln>
             <a:extLst>
               <a:ext uri="{91240B29-F687-4f45-9708-019B960494DF}">
-                <a14:hiddenLine xmlns:a14="http://schemas.microsoft.com/office/drawing/2010/main" xmlns="" w="9525">
+                <a14:hiddenLine xmlns="" xmlns:a14="http://schemas.microsoft.com/office/drawing/2010/main" w="9525">
                   <a:solidFill>
                     <a:srgbClr val="000000"/>
                   </a:solidFill>
@@ -3287,7 +3287,7 @@
             </a:ln>
             <a:extLst>
               <a:ext uri="{91240B29-F687-4f45-9708-019B960494DF}">
-                <a14:hiddenLine xmlns:a14="http://schemas.microsoft.com/office/drawing/2010/main" xmlns="" w="9525">
+                <a14:hiddenLine xmlns="" xmlns:a14="http://schemas.microsoft.com/office/drawing/2010/main" w="9525">
                   <a:solidFill>
                     <a:srgbClr val="000000"/>
                   </a:solidFill>
@@ -3377,7 +3377,7 @@
             </a:ln>
             <a:extLst>
               <a:ext uri="{91240B29-F687-4f45-9708-019B960494DF}">
-                <a14:hiddenLine xmlns:a14="http://schemas.microsoft.com/office/drawing/2010/main" xmlns="" w="9525">
+                <a14:hiddenLine xmlns="" xmlns:a14="http://schemas.microsoft.com/office/drawing/2010/main" w="9525">
                   <a:solidFill>
                     <a:srgbClr val="000000"/>
                   </a:solidFill>
@@ -3439,7 +3439,7 @@
             </a:ln>
             <a:extLst>
               <a:ext uri="{91240B29-F687-4f45-9708-019B960494DF}">
-                <a14:hiddenLine xmlns:a14="http://schemas.microsoft.com/office/drawing/2010/main" xmlns="" w="9525">
+                <a14:hiddenLine xmlns="" xmlns:a14="http://schemas.microsoft.com/office/drawing/2010/main" w="9525">
                   <a:solidFill>
                     <a:srgbClr val="000000"/>
                   </a:solidFill>
@@ -3529,7 +3529,7 @@
             </a:ln>
             <a:extLst>
               <a:ext uri="{91240B29-F687-4f45-9708-019B960494DF}">
-                <a14:hiddenLine xmlns:a14="http://schemas.microsoft.com/office/drawing/2010/main" xmlns="" w="9525">
+                <a14:hiddenLine xmlns="" xmlns:a14="http://schemas.microsoft.com/office/drawing/2010/main" w="9525">
                   <a:solidFill>
                     <a:srgbClr val="000000"/>
                   </a:solidFill>
@@ -3619,7 +3619,7 @@
             </a:ln>
             <a:extLst>
               <a:ext uri="{91240B29-F687-4f45-9708-019B960494DF}">
-                <a14:hiddenLine xmlns:a14="http://schemas.microsoft.com/office/drawing/2010/main" xmlns="" w="9525">
+                <a14:hiddenLine xmlns="" xmlns:a14="http://schemas.microsoft.com/office/drawing/2010/main" w="9525">
                   <a:solidFill>
                     <a:srgbClr val="000000"/>
                   </a:solidFill>
@@ -3684,7 +3684,7 @@
             </a:ln>
             <a:extLst>
               <a:ext uri="{91240B29-F687-4f45-9708-019B960494DF}">
-                <a14:hiddenLine xmlns:a14="http://schemas.microsoft.com/office/drawing/2010/main" xmlns="" w="9525">
+                <a14:hiddenLine xmlns="" xmlns:a14="http://schemas.microsoft.com/office/drawing/2010/main" w="9525">
                   <a:solidFill>
                     <a:srgbClr val="000000"/>
                   </a:solidFill>
@@ -3746,7 +3746,7 @@
             </a:ln>
             <a:extLst>
               <a:ext uri="{91240B29-F687-4f45-9708-019B960494DF}">
-                <a14:hiddenLine xmlns:a14="http://schemas.microsoft.com/office/drawing/2010/main" xmlns="" w="9525">
+                <a14:hiddenLine xmlns="" xmlns:a14="http://schemas.microsoft.com/office/drawing/2010/main" w="9525">
                   <a:solidFill>
                     <a:srgbClr val="000000"/>
                   </a:solidFill>
@@ -3836,7 +3836,7 @@
             </a:ln>
             <a:extLst>
               <a:ext uri="{91240B29-F687-4f45-9708-019B960494DF}">
-                <a14:hiddenLine xmlns:a14="http://schemas.microsoft.com/office/drawing/2010/main" xmlns="" w="9525">
+                <a14:hiddenLine xmlns="" xmlns:a14="http://schemas.microsoft.com/office/drawing/2010/main" w="9525">
                   <a:solidFill>
                     <a:srgbClr val="000000"/>
                   </a:solidFill>
@@ -3926,7 +3926,7 @@
             </a:ln>
             <a:extLst>
               <a:ext uri="{91240B29-F687-4f45-9708-019B960494DF}">
-                <a14:hiddenLine xmlns:a14="http://schemas.microsoft.com/office/drawing/2010/main" xmlns="" w="9525">
+                <a14:hiddenLine xmlns="" xmlns:a14="http://schemas.microsoft.com/office/drawing/2010/main" w="9525">
                   <a:solidFill>
                     <a:srgbClr val="000000"/>
                   </a:solidFill>
@@ -3988,7 +3988,7 @@
             </a:ln>
             <a:extLst>
               <a:ext uri="{91240B29-F687-4f45-9708-019B960494DF}">
-                <a14:hiddenLine xmlns:a14="http://schemas.microsoft.com/office/drawing/2010/main" xmlns="" w="9525">
+                <a14:hiddenLine xmlns="" xmlns:a14="http://schemas.microsoft.com/office/drawing/2010/main" w="9525">
                   <a:solidFill>
                     <a:srgbClr val="000000"/>
                   </a:solidFill>
@@ -4108,7 +4108,7 @@
             </a:ln>
             <a:extLst>
               <a:ext uri="{91240B29-F687-4f45-9708-019B960494DF}">
-                <a14:hiddenLine xmlns:a14="http://schemas.microsoft.com/office/drawing/2010/main" xmlns="" w="9525">
+                <a14:hiddenLine xmlns="" xmlns:a14="http://schemas.microsoft.com/office/drawing/2010/main" w="9525">
                   <a:solidFill>
                     <a:srgbClr val="000000"/>
                   </a:solidFill>
@@ -4176,7 +4176,7 @@
             </a:ln>
             <a:extLst>
               <a:ext uri="{91240B29-F687-4f45-9708-019B960494DF}">
-                <a14:hiddenLine xmlns:a14="http://schemas.microsoft.com/office/drawing/2010/main" xmlns="" w="9525">
+                <a14:hiddenLine xmlns="" xmlns:a14="http://schemas.microsoft.com/office/drawing/2010/main" w="9525">
                   <a:solidFill>
                     <a:srgbClr val="000000"/>
                   </a:solidFill>
@@ -4266,7 +4266,7 @@
             </a:ln>
             <a:extLst>
               <a:ext uri="{91240B29-F687-4f45-9708-019B960494DF}">
-                <a14:hiddenLine xmlns:a14="http://schemas.microsoft.com/office/drawing/2010/main" xmlns="" w="9525">
+                <a14:hiddenLine xmlns="" xmlns:a14="http://schemas.microsoft.com/office/drawing/2010/main" w="9525">
                   <a:solidFill>
                     <a:srgbClr val="000000"/>
                   </a:solidFill>
@@ -4406,7 +4406,7 @@
           <a:p>
             <a:fld id="{EB7344F3-385B-4416-9BA2-CA4571DF68C9}" type="datetimeFigureOut">
               <a:rPr lang="en-MY" smtClean="0"/>
-              <a:t>9/9/2020</a:t>
+              <a:t>11/9/2020</a:t>
             </a:fld>
             <a:endParaRPr lang="en-MY"/>
           </a:p>
@@ -4673,7 +4673,7 @@
           <a:p>
             <a:fld id="{EB7344F3-385B-4416-9BA2-CA4571DF68C9}" type="datetimeFigureOut">
               <a:rPr lang="en-MY" smtClean="0"/>
-              <a:t>9/9/2020</a:t>
+              <a:t>11/9/2020</a:t>
             </a:fld>
             <a:endParaRPr lang="en-MY"/>
           </a:p>
@@ -4869,7 +4869,7 @@
           <a:p>
             <a:fld id="{EB7344F3-385B-4416-9BA2-CA4571DF68C9}" type="datetimeFigureOut">
               <a:rPr lang="en-MY" smtClean="0"/>
-              <a:t>9/9/2020</a:t>
+              <a:t>11/9/2020</a:t>
             </a:fld>
             <a:endParaRPr lang="en-MY"/>
           </a:p>
@@ -5132,7 +5132,7 @@
           <a:p>
             <a:fld id="{EB7344F3-385B-4416-9BA2-CA4571DF68C9}" type="datetimeFigureOut">
               <a:rPr lang="en-MY" smtClean="0"/>
-              <a:t>9/9/2020</a:t>
+              <a:t>11/9/2020</a:t>
             </a:fld>
             <a:endParaRPr lang="en-MY"/>
           </a:p>
@@ -5566,7 +5566,7 @@
           <a:p>
             <a:fld id="{EB7344F3-385B-4416-9BA2-CA4571DF68C9}" type="datetimeFigureOut">
               <a:rPr lang="en-MY" smtClean="0"/>
-              <a:t>9/9/2020</a:t>
+              <a:t>11/9/2020</a:t>
             </a:fld>
             <a:endParaRPr lang="en-MY"/>
           </a:p>
@@ -6112,7 +6112,7 @@
           <a:p>
             <a:fld id="{EB7344F3-385B-4416-9BA2-CA4571DF68C9}" type="datetimeFigureOut">
               <a:rPr lang="en-MY" smtClean="0"/>
-              <a:t>9/9/2020</a:t>
+              <a:t>11/9/2020</a:t>
             </a:fld>
             <a:endParaRPr lang="en-MY"/>
           </a:p>
@@ -6832,7 +6832,7 @@
           <a:p>
             <a:fld id="{EB7344F3-385B-4416-9BA2-CA4571DF68C9}" type="datetimeFigureOut">
               <a:rPr lang="en-MY" smtClean="0"/>
-              <a:t>9/9/2020</a:t>
+              <a:t>11/9/2020</a:t>
             </a:fld>
             <a:endParaRPr lang="en-MY"/>
           </a:p>
@@ -7002,7 +7002,7 @@
           <a:p>
             <a:fld id="{EB7344F3-385B-4416-9BA2-CA4571DF68C9}" type="datetimeFigureOut">
               <a:rPr lang="en-MY" smtClean="0"/>
-              <a:t>9/9/2020</a:t>
+              <a:t>11/9/2020</a:t>
             </a:fld>
             <a:endParaRPr lang="en-MY"/>
           </a:p>
@@ -7182,7 +7182,7 @@
           <a:p>
             <a:fld id="{EB7344F3-385B-4416-9BA2-CA4571DF68C9}" type="datetimeFigureOut">
               <a:rPr lang="en-MY" smtClean="0"/>
-              <a:t>9/9/2020</a:t>
+              <a:t>11/9/2020</a:t>
             </a:fld>
             <a:endParaRPr lang="en-MY"/>
           </a:p>
@@ -7352,7 +7352,7 @@
           <a:p>
             <a:fld id="{EB7344F3-385B-4416-9BA2-CA4571DF68C9}" type="datetimeFigureOut">
               <a:rPr lang="en-MY" smtClean="0"/>
-              <a:t>9/9/2020</a:t>
+              <a:t>11/9/2020</a:t>
             </a:fld>
             <a:endParaRPr lang="en-MY"/>
           </a:p>
@@ -7602,7 +7602,7 @@
           <a:p>
             <a:fld id="{EB7344F3-385B-4416-9BA2-CA4571DF68C9}" type="datetimeFigureOut">
               <a:rPr lang="en-MY" smtClean="0"/>
-              <a:t>9/9/2020</a:t>
+              <a:t>11/9/2020</a:t>
             </a:fld>
             <a:endParaRPr lang="en-MY"/>
           </a:p>
@@ -7834,7 +7834,7 @@
           <a:p>
             <a:fld id="{EB7344F3-385B-4416-9BA2-CA4571DF68C9}" type="datetimeFigureOut">
               <a:rPr lang="en-MY" smtClean="0"/>
-              <a:t>9/9/2020</a:t>
+              <a:t>11/9/2020</a:t>
             </a:fld>
             <a:endParaRPr lang="en-MY"/>
           </a:p>
@@ -8215,7 +8215,7 @@
           <a:p>
             <a:fld id="{EB7344F3-385B-4416-9BA2-CA4571DF68C9}" type="datetimeFigureOut">
               <a:rPr lang="en-MY" smtClean="0"/>
-              <a:t>9/9/2020</a:t>
+              <a:t>11/9/2020</a:t>
             </a:fld>
             <a:endParaRPr lang="en-MY"/>
           </a:p>
@@ -8333,7 +8333,7 @@
           <a:p>
             <a:fld id="{EB7344F3-385B-4416-9BA2-CA4571DF68C9}" type="datetimeFigureOut">
               <a:rPr lang="en-MY" smtClean="0"/>
-              <a:t>9/9/2020</a:t>
+              <a:t>11/9/2020</a:t>
             </a:fld>
             <a:endParaRPr lang="en-MY"/>
           </a:p>
@@ -8428,7 +8428,7 @@
           <a:p>
             <a:fld id="{EB7344F3-385B-4416-9BA2-CA4571DF68C9}" type="datetimeFigureOut">
               <a:rPr lang="en-MY" smtClean="0"/>
-              <a:t>9/9/2020</a:t>
+              <a:t>11/9/2020</a:t>
             </a:fld>
             <a:endParaRPr lang="en-MY"/>
           </a:p>
@@ -8677,7 +8677,7 @@
           <a:p>
             <a:fld id="{EB7344F3-385B-4416-9BA2-CA4571DF68C9}" type="datetimeFigureOut">
               <a:rPr lang="en-MY" smtClean="0"/>
-              <a:t>9/9/2020</a:t>
+              <a:t>11/9/2020</a:t>
             </a:fld>
             <a:endParaRPr lang="en-MY"/>
           </a:p>
@@ -8957,7 +8957,7 @@
           <a:p>
             <a:fld id="{EB7344F3-385B-4416-9BA2-CA4571DF68C9}" type="datetimeFigureOut">
               <a:rPr lang="en-MY" smtClean="0"/>
-              <a:t>9/9/2020</a:t>
+              <a:t>11/9/2020</a:t>
             </a:fld>
             <a:endParaRPr lang="en-MY"/>
           </a:p>
@@ -9080,7 +9080,7 @@
           <a:noFill/>
           <a:extLst>
             <a:ext uri="{909E8E84-426E-40dd-AFC4-6F175D3DCCD1}">
-              <a14:hiddenFill xmlns:a14="http://schemas.microsoft.com/office/drawing/2010/main" xmlns="">
+              <a14:hiddenFill xmlns="" xmlns:a14="http://schemas.microsoft.com/office/drawing/2010/main">
                 <a:solidFill>
                   <a:srgbClr val="FFFFFF"/>
                 </a:solidFill>
@@ -9154,7 +9154,7 @@
               </a:ln>
               <a:extLst>
                 <a:ext uri="{91240B29-F687-4f45-9708-019B960494DF}">
-                  <a14:hiddenLine xmlns:a14="http://schemas.microsoft.com/office/drawing/2010/main" xmlns="" w="9525">
+                  <a14:hiddenLine xmlns="" xmlns:a14="http://schemas.microsoft.com/office/drawing/2010/main" w="9525">
                     <a:solidFill>
                       <a:srgbClr val="000000"/>
                     </a:solidFill>
@@ -9244,7 +9244,7 @@
               </a:ln>
               <a:extLst>
                 <a:ext uri="{91240B29-F687-4f45-9708-019B960494DF}">
-                  <a14:hiddenLine xmlns:a14="http://schemas.microsoft.com/office/drawing/2010/main" xmlns="" w="9525">
+                  <a14:hiddenLine xmlns="" xmlns:a14="http://schemas.microsoft.com/office/drawing/2010/main" w="9525">
                     <a:solidFill>
                       <a:srgbClr val="000000"/>
                     </a:solidFill>
@@ -9334,7 +9334,7 @@
               </a:ln>
               <a:extLst>
                 <a:ext uri="{91240B29-F687-4f45-9708-019B960494DF}">
-                  <a14:hiddenLine xmlns:a14="http://schemas.microsoft.com/office/drawing/2010/main" xmlns="" w="9525">
+                  <a14:hiddenLine xmlns="" xmlns:a14="http://schemas.microsoft.com/office/drawing/2010/main" w="9525">
                     <a:solidFill>
                       <a:srgbClr val="000000"/>
                     </a:solidFill>
@@ -9396,7 +9396,7 @@
               </a:ln>
               <a:extLst>
                 <a:ext uri="{91240B29-F687-4f45-9708-019B960494DF}">
-                  <a14:hiddenLine xmlns:a14="http://schemas.microsoft.com/office/drawing/2010/main" xmlns="" w="9525">
+                  <a14:hiddenLine xmlns="" xmlns:a14="http://schemas.microsoft.com/office/drawing/2010/main" w="9525">
                     <a:solidFill>
                       <a:srgbClr val="000000"/>
                     </a:solidFill>
@@ -9486,7 +9486,7 @@
               </a:ln>
               <a:extLst>
                 <a:ext uri="{91240B29-F687-4f45-9708-019B960494DF}">
-                  <a14:hiddenLine xmlns:a14="http://schemas.microsoft.com/office/drawing/2010/main" xmlns="" w="9525">
+                  <a14:hiddenLine xmlns="" xmlns:a14="http://schemas.microsoft.com/office/drawing/2010/main" w="9525">
                     <a:solidFill>
                       <a:srgbClr val="000000"/>
                     </a:solidFill>
@@ -9548,7 +9548,7 @@
               </a:ln>
               <a:extLst>
                 <a:ext uri="{91240B29-F687-4f45-9708-019B960494DF}">
-                  <a14:hiddenLine xmlns:a14="http://schemas.microsoft.com/office/drawing/2010/main" xmlns="" w="9525">
+                  <a14:hiddenLine xmlns="" xmlns:a14="http://schemas.microsoft.com/office/drawing/2010/main" w="9525">
                     <a:solidFill>
                       <a:srgbClr val="000000"/>
                     </a:solidFill>
@@ -9610,7 +9610,7 @@
               </a:ln>
               <a:extLst>
                 <a:ext uri="{91240B29-F687-4f45-9708-019B960494DF}">
-                  <a14:hiddenLine xmlns:a14="http://schemas.microsoft.com/office/drawing/2010/main" xmlns="" w="9525">
+                  <a14:hiddenLine xmlns="" xmlns:a14="http://schemas.microsoft.com/office/drawing/2010/main" w="9525">
                     <a:solidFill>
                       <a:srgbClr val="000000"/>
                     </a:solidFill>
@@ -9700,7 +9700,7 @@
               </a:ln>
               <a:extLst>
                 <a:ext uri="{91240B29-F687-4f45-9708-019B960494DF}">
-                  <a14:hiddenLine xmlns:a14="http://schemas.microsoft.com/office/drawing/2010/main" xmlns="" w="9525">
+                  <a14:hiddenLine xmlns="" xmlns:a14="http://schemas.microsoft.com/office/drawing/2010/main" w="9525">
                     <a:solidFill>
                       <a:srgbClr val="000000"/>
                     </a:solidFill>
@@ -9790,7 +9790,7 @@
               </a:ln>
               <a:extLst>
                 <a:ext uri="{91240B29-F687-4f45-9708-019B960494DF}">
-                  <a14:hiddenLine xmlns:a14="http://schemas.microsoft.com/office/drawing/2010/main" xmlns="" w="9525">
+                  <a14:hiddenLine xmlns="" xmlns:a14="http://schemas.microsoft.com/office/drawing/2010/main" w="9525">
                     <a:solidFill>
                       <a:srgbClr val="000000"/>
                     </a:solidFill>
@@ -9852,7 +9852,7 @@
               </a:ln>
               <a:extLst>
                 <a:ext uri="{91240B29-F687-4f45-9708-019B960494DF}">
-                  <a14:hiddenLine xmlns:a14="http://schemas.microsoft.com/office/drawing/2010/main" xmlns="" w="9525">
+                  <a14:hiddenLine xmlns="" xmlns:a14="http://schemas.microsoft.com/office/drawing/2010/main" w="9525">
                     <a:solidFill>
                       <a:srgbClr val="000000"/>
                     </a:solidFill>
@@ -9962,7 +9962,7 @@
               </a:ln>
               <a:extLst>
                 <a:ext uri="{91240B29-F687-4f45-9708-019B960494DF}">
-                  <a14:hiddenLine xmlns:a14="http://schemas.microsoft.com/office/drawing/2010/main" xmlns="" w="9525">
+                  <a14:hiddenLine xmlns="" xmlns:a14="http://schemas.microsoft.com/office/drawing/2010/main" w="9525">
                     <a:solidFill>
                       <a:srgbClr val="000000"/>
                     </a:solidFill>
@@ -10046,7 +10046,7 @@
               </a:ln>
               <a:extLst>
                 <a:ext uri="{91240B29-F687-4f45-9708-019B960494DF}">
-                  <a14:hiddenLine xmlns:a14="http://schemas.microsoft.com/office/drawing/2010/main" xmlns="" w="9525">
+                  <a14:hiddenLine xmlns="" xmlns:a14="http://schemas.microsoft.com/office/drawing/2010/main" w="9525">
                     <a:solidFill>
                       <a:srgbClr val="000000"/>
                     </a:solidFill>
@@ -10108,7 +10108,7 @@
               </a:ln>
               <a:extLst>
                 <a:ext uri="{91240B29-F687-4f45-9708-019B960494DF}">
-                  <a14:hiddenLine xmlns:a14="http://schemas.microsoft.com/office/drawing/2010/main" xmlns="" w="9525">
+                  <a14:hiddenLine xmlns="" xmlns:a14="http://schemas.microsoft.com/office/drawing/2010/main" w="9525">
                     <a:solidFill>
                       <a:srgbClr val="000000"/>
                     </a:solidFill>
@@ -10170,7 +10170,7 @@
               </a:ln>
               <a:extLst>
                 <a:ext uri="{91240B29-F687-4f45-9708-019B960494DF}">
-                  <a14:hiddenLine xmlns:a14="http://schemas.microsoft.com/office/drawing/2010/main" xmlns="" w="9525">
+                  <a14:hiddenLine xmlns="" xmlns:a14="http://schemas.microsoft.com/office/drawing/2010/main" w="9525">
                     <a:solidFill>
                       <a:srgbClr val="000000"/>
                     </a:solidFill>
@@ -10260,7 +10260,7 @@
               </a:ln>
               <a:extLst>
                 <a:ext uri="{91240B29-F687-4f45-9708-019B960494DF}">
-                  <a14:hiddenLine xmlns:a14="http://schemas.microsoft.com/office/drawing/2010/main" xmlns="" w="9525">
+                  <a14:hiddenLine xmlns="" xmlns:a14="http://schemas.microsoft.com/office/drawing/2010/main" w="9525">
                     <a:solidFill>
                       <a:srgbClr val="000000"/>
                     </a:solidFill>
@@ -10294,7 +10294,7 @@
               </a:ln>
               <a:extLst>
                 <a:ext uri="{91240B29-F687-4f45-9708-019B960494DF}">
-                  <a14:hiddenLine xmlns:a14="http://schemas.microsoft.com/office/drawing/2010/main" xmlns="" w="9525">
+                  <a14:hiddenLine xmlns="" xmlns:a14="http://schemas.microsoft.com/office/drawing/2010/main" w="9525">
                     <a:solidFill>
                       <a:srgbClr val="000000"/>
                     </a:solidFill>
@@ -10359,7 +10359,7 @@
               </a:ln>
               <a:extLst>
                 <a:ext uri="{91240B29-F687-4f45-9708-019B960494DF}">
-                  <a14:hiddenLine xmlns:a14="http://schemas.microsoft.com/office/drawing/2010/main" xmlns="" w="9525">
+                  <a14:hiddenLine xmlns="" xmlns:a14="http://schemas.microsoft.com/office/drawing/2010/main" w="9525">
                     <a:solidFill>
                       <a:srgbClr val="000000"/>
                     </a:solidFill>
@@ -10449,7 +10449,7 @@
               </a:ln>
               <a:extLst>
                 <a:ext uri="{91240B29-F687-4f45-9708-019B960494DF}">
-                  <a14:hiddenLine xmlns:a14="http://schemas.microsoft.com/office/drawing/2010/main" xmlns="" w="9525">
+                  <a14:hiddenLine xmlns="" xmlns:a14="http://schemas.microsoft.com/office/drawing/2010/main" w="9525">
                     <a:solidFill>
                       <a:srgbClr val="000000"/>
                     </a:solidFill>
@@ -10511,7 +10511,7 @@
               </a:ln>
               <a:extLst>
                 <a:ext uri="{91240B29-F687-4f45-9708-019B960494DF}">
-                  <a14:hiddenLine xmlns:a14="http://schemas.microsoft.com/office/drawing/2010/main" xmlns="" w="9525">
+                  <a14:hiddenLine xmlns="" xmlns:a14="http://schemas.microsoft.com/office/drawing/2010/main" w="9525">
                     <a:solidFill>
                       <a:srgbClr val="000000"/>
                     </a:solidFill>
@@ -10601,7 +10601,7 @@
               </a:ln>
               <a:extLst>
                 <a:ext uri="{91240B29-F687-4f45-9708-019B960494DF}">
-                  <a14:hiddenLine xmlns:a14="http://schemas.microsoft.com/office/drawing/2010/main" xmlns="" w="9525">
+                  <a14:hiddenLine xmlns="" xmlns:a14="http://schemas.microsoft.com/office/drawing/2010/main" w="9525">
                     <a:solidFill>
                       <a:srgbClr val="000000"/>
                     </a:solidFill>
@@ -10666,7 +10666,7 @@
               </a:ln>
               <a:extLst>
                 <a:ext uri="{91240B29-F687-4f45-9708-019B960494DF}">
-                  <a14:hiddenLine xmlns:a14="http://schemas.microsoft.com/office/drawing/2010/main" xmlns="" w="9525">
+                  <a14:hiddenLine xmlns="" xmlns:a14="http://schemas.microsoft.com/office/drawing/2010/main" w="9525">
                     <a:solidFill>
                       <a:srgbClr val="000000"/>
                     </a:solidFill>
@@ -10728,7 +10728,7 @@
               </a:ln>
               <a:extLst>
                 <a:ext uri="{91240B29-F687-4f45-9708-019B960494DF}">
-                  <a14:hiddenLine xmlns:a14="http://schemas.microsoft.com/office/drawing/2010/main" xmlns="" w="9525">
+                  <a14:hiddenLine xmlns="" xmlns:a14="http://schemas.microsoft.com/office/drawing/2010/main" w="9525">
                     <a:solidFill>
                       <a:srgbClr val="000000"/>
                     </a:solidFill>
@@ -10818,7 +10818,7 @@
               </a:ln>
               <a:extLst>
                 <a:ext uri="{91240B29-F687-4f45-9708-019B960494DF}">
-                  <a14:hiddenLine xmlns:a14="http://schemas.microsoft.com/office/drawing/2010/main" xmlns="" w="9525">
+                  <a14:hiddenLine xmlns="" xmlns:a14="http://schemas.microsoft.com/office/drawing/2010/main" w="9525">
                     <a:solidFill>
                       <a:srgbClr val="000000"/>
                     </a:solidFill>
@@ -10908,7 +10908,7 @@
               </a:ln>
               <a:extLst>
                 <a:ext uri="{91240B29-F687-4f45-9708-019B960494DF}">
-                  <a14:hiddenLine xmlns:a14="http://schemas.microsoft.com/office/drawing/2010/main" xmlns="" w="9525">
+                  <a14:hiddenLine xmlns="" xmlns:a14="http://schemas.microsoft.com/office/drawing/2010/main" w="9525">
                     <a:solidFill>
                       <a:srgbClr val="000000"/>
                     </a:solidFill>
@@ -10973,7 +10973,7 @@
               </a:ln>
               <a:extLst>
                 <a:ext uri="{91240B29-F687-4f45-9708-019B960494DF}">
-                  <a14:hiddenLine xmlns:a14="http://schemas.microsoft.com/office/drawing/2010/main" xmlns="" w="9525">
+                  <a14:hiddenLine xmlns="" xmlns:a14="http://schemas.microsoft.com/office/drawing/2010/main" w="9525">
                     <a:solidFill>
                       <a:srgbClr val="000000"/>
                     </a:solidFill>
@@ -11093,7 +11093,7 @@
               </a:ln>
               <a:extLst>
                 <a:ext uri="{91240B29-F687-4f45-9708-019B960494DF}">
-                  <a14:hiddenLine xmlns:a14="http://schemas.microsoft.com/office/drawing/2010/main" xmlns="" w="9525">
+                  <a14:hiddenLine xmlns="" xmlns:a14="http://schemas.microsoft.com/office/drawing/2010/main" w="9525">
                     <a:solidFill>
                       <a:srgbClr val="000000"/>
                     </a:solidFill>
@@ -11174,7 +11174,7 @@
               </a:ln>
               <a:extLst>
                 <a:ext uri="{91240B29-F687-4f45-9708-019B960494DF}">
-                  <a14:hiddenLine xmlns:a14="http://schemas.microsoft.com/office/drawing/2010/main" xmlns="" w="9525">
+                  <a14:hiddenLine xmlns="" xmlns:a14="http://schemas.microsoft.com/office/drawing/2010/main" w="9525">
                     <a:solidFill>
                       <a:srgbClr val="000000"/>
                     </a:solidFill>
@@ -11289,7 +11289,7 @@
               </a:ln>
               <a:extLst>
                 <a:ext uri="{91240B29-F687-4f45-9708-019B960494DF}">
-                  <a14:hiddenLine xmlns:a14="http://schemas.microsoft.com/office/drawing/2010/main" xmlns="" w="9525">
+                  <a14:hiddenLine xmlns="" xmlns:a14="http://schemas.microsoft.com/office/drawing/2010/main" w="9525">
                     <a:solidFill>
                       <a:srgbClr val="000000"/>
                     </a:solidFill>
@@ -11379,7 +11379,7 @@
               </a:ln>
               <a:extLst>
                 <a:ext uri="{91240B29-F687-4f45-9708-019B960494DF}">
-                  <a14:hiddenLine xmlns:a14="http://schemas.microsoft.com/office/drawing/2010/main" xmlns="" w="9525">
+                  <a14:hiddenLine xmlns="" xmlns:a14="http://schemas.microsoft.com/office/drawing/2010/main" w="9525">
                     <a:solidFill>
                       <a:srgbClr val="000000"/>
                     </a:solidFill>
@@ -11444,7 +11444,7 @@
               </a:ln>
               <a:extLst>
                 <a:ext uri="{91240B29-F687-4f45-9708-019B960494DF}">
-                  <a14:hiddenLine xmlns:a14="http://schemas.microsoft.com/office/drawing/2010/main" xmlns="" w="9525">
+                  <a14:hiddenLine xmlns="" xmlns:a14="http://schemas.microsoft.com/office/drawing/2010/main" w="9525">
                     <a:solidFill>
                       <a:srgbClr val="000000"/>
                     </a:solidFill>
@@ -11534,7 +11534,7 @@
               </a:ln>
               <a:extLst>
                 <a:ext uri="{91240B29-F687-4f45-9708-019B960494DF}">
-                  <a14:hiddenLine xmlns:a14="http://schemas.microsoft.com/office/drawing/2010/main" xmlns="" w="9525">
+                  <a14:hiddenLine xmlns="" xmlns:a14="http://schemas.microsoft.com/office/drawing/2010/main" w="9525">
                     <a:solidFill>
                       <a:srgbClr val="000000"/>
                     </a:solidFill>
@@ -11602,7 +11602,7 @@
               </a:ln>
               <a:extLst>
                 <a:ext uri="{91240B29-F687-4f45-9708-019B960494DF}">
-                  <a14:hiddenLine xmlns:a14="http://schemas.microsoft.com/office/drawing/2010/main" xmlns="" w="9525">
+                  <a14:hiddenLine xmlns="" xmlns:a14="http://schemas.microsoft.com/office/drawing/2010/main" w="9525">
                     <a:solidFill>
                       <a:srgbClr val="000000"/>
                     </a:solidFill>
@@ -11692,7 +11692,7 @@
               </a:ln>
               <a:extLst>
                 <a:ext uri="{91240B29-F687-4f45-9708-019B960494DF}">
-                  <a14:hiddenLine xmlns:a14="http://schemas.microsoft.com/office/drawing/2010/main" xmlns="" w="9525">
+                  <a14:hiddenLine xmlns="" xmlns:a14="http://schemas.microsoft.com/office/drawing/2010/main" w="9525">
                     <a:solidFill>
                       <a:srgbClr val="000000"/>
                     </a:solidFill>
@@ -11760,7 +11760,7 @@
               </a:ln>
               <a:extLst>
                 <a:ext uri="{91240B29-F687-4f45-9708-019B960494DF}">
-                  <a14:hiddenLine xmlns:a14="http://schemas.microsoft.com/office/drawing/2010/main" xmlns="" w="9525">
+                  <a14:hiddenLine xmlns="" xmlns:a14="http://schemas.microsoft.com/office/drawing/2010/main" w="9525">
                     <a:solidFill>
                       <a:srgbClr val="000000"/>
                     </a:solidFill>
@@ -11850,7 +11850,7 @@
               </a:ln>
               <a:extLst>
                 <a:ext uri="{91240B29-F687-4f45-9708-019B960494DF}">
-                  <a14:hiddenLine xmlns:a14="http://schemas.microsoft.com/office/drawing/2010/main" xmlns="" w="9525">
+                  <a14:hiddenLine xmlns="" xmlns:a14="http://schemas.microsoft.com/office/drawing/2010/main" w="9525">
                     <a:solidFill>
                       <a:srgbClr val="000000"/>
                     </a:solidFill>
@@ -11884,7 +11884,7 @@
               </a:ln>
               <a:extLst>
                 <a:ext uri="{91240B29-F687-4f45-9708-019B960494DF}">
-                  <a14:hiddenLine xmlns:a14="http://schemas.microsoft.com/office/drawing/2010/main" xmlns="" w="9525">
+                  <a14:hiddenLine xmlns="" xmlns:a14="http://schemas.microsoft.com/office/drawing/2010/main" w="9525">
                     <a:solidFill>
                       <a:srgbClr val="000000"/>
                     </a:solidFill>
@@ -12024,7 +12024,7 @@
           <a:p>
             <a:fld id="{EB7344F3-385B-4416-9BA2-CA4571DF68C9}" type="datetimeFigureOut">
               <a:rPr lang="en-MY" smtClean="0"/>
-              <a:t>9/9/2020</a:t>
+              <a:t>11/9/2020</a:t>
             </a:fld>
             <a:endParaRPr lang="en-MY"/>
           </a:p>
@@ -13595,6 +13595,14 @@
   <p:clrMapOvr>
     <a:masterClrMapping/>
   </p:clrMapOvr>
+  <mc:AlternateContent xmlns:mc="http://schemas.openxmlformats.org/markup-compatibility/2006">
+    <mc:Choice xmlns:p14="http://schemas.microsoft.com/office/powerpoint/2010/main" Requires="p14">
+      <p:transition spd="slow" p14:dur="2000" advClick="0"/>
+    </mc:Choice>
+    <mc:Fallback>
+      <p:transition spd="slow" advClick="0"/>
+    </mc:Fallback>
+  </mc:AlternateContent>
 </p:sld>
 </file>
 
@@ -13898,6 +13906,14 @@
   <p:clrMapOvr>
     <a:masterClrMapping/>
   </p:clrMapOvr>
+  <mc:AlternateContent xmlns:mc="http://schemas.openxmlformats.org/markup-compatibility/2006">
+    <mc:Choice xmlns:p14="http://schemas.microsoft.com/office/powerpoint/2010/main" Requires="p14">
+      <p:transition spd="slow" p14:dur="2000" advClick="0"/>
+    </mc:Choice>
+    <mc:Fallback>
+      <p:transition spd="slow" advClick="0"/>
+    </mc:Fallback>
+  </mc:AlternateContent>
 </p:sld>
 </file>
 
@@ -14135,6 +14151,14 @@
   <p:clrMapOvr>
     <a:masterClrMapping/>
   </p:clrMapOvr>
+  <mc:AlternateContent xmlns:mc="http://schemas.openxmlformats.org/markup-compatibility/2006">
+    <mc:Choice xmlns:p14="http://schemas.microsoft.com/office/powerpoint/2010/main" Requires="p14">
+      <p:transition spd="slow" p14:dur="2000" advClick="0"/>
+    </mc:Choice>
+    <mc:Fallback>
+      <p:transition spd="slow" advClick="0"/>
+    </mc:Fallback>
+  </mc:AlternateContent>
 </p:sld>
 </file>
 
@@ -14372,6 +14396,14 @@
   <p:clrMapOvr>
     <a:masterClrMapping/>
   </p:clrMapOvr>
+  <mc:AlternateContent xmlns:mc="http://schemas.openxmlformats.org/markup-compatibility/2006">
+    <mc:Choice xmlns:p14="http://schemas.microsoft.com/office/powerpoint/2010/main" Requires="p14">
+      <p:transition spd="slow" p14:dur="2000" advClick="0"/>
+    </mc:Choice>
+    <mc:Fallback>
+      <p:transition spd="slow" advClick="0"/>
+    </mc:Fallback>
+  </mc:AlternateContent>
 </p:sld>
 </file>
 
@@ -14610,6 +14642,14 @@
   <p:clrMapOvr>
     <a:masterClrMapping/>
   </p:clrMapOvr>
+  <mc:AlternateContent xmlns:mc="http://schemas.openxmlformats.org/markup-compatibility/2006">
+    <mc:Choice xmlns:p14="http://schemas.microsoft.com/office/powerpoint/2010/main" Requires="p14">
+      <p:transition spd="slow" p14:dur="2000" advClick="0"/>
+    </mc:Choice>
+    <mc:Fallback>
+      <p:transition spd="slow" advClick="0"/>
+    </mc:Fallback>
+  </mc:AlternateContent>
 </p:sld>
 </file>
 
@@ -15086,6 +15126,14 @@
   <p:clrMapOvr>
     <a:masterClrMapping/>
   </p:clrMapOvr>
+  <mc:AlternateContent xmlns:mc="http://schemas.openxmlformats.org/markup-compatibility/2006">
+    <mc:Choice xmlns:p14="http://schemas.microsoft.com/office/powerpoint/2010/main" Requires="p14">
+      <p:transition spd="slow" p14:dur="2000" advClick="0"/>
+    </mc:Choice>
+    <mc:Fallback>
+      <p:transition spd="slow" advClick="0"/>
+    </mc:Fallback>
+  </mc:AlternateContent>
 </p:sld>
 </file>
 
@@ -15388,6 +15436,14 @@
   <p:clrMapOvr>
     <a:masterClrMapping/>
   </p:clrMapOvr>
+  <mc:AlternateContent xmlns:mc="http://schemas.openxmlformats.org/markup-compatibility/2006">
+    <mc:Choice xmlns:p14="http://schemas.microsoft.com/office/powerpoint/2010/main" Requires="p14">
+      <p:transition spd="slow" p14:dur="2000" advClick="0"/>
+    </mc:Choice>
+    <mc:Fallback>
+      <p:transition spd="slow" advClick="0"/>
+    </mc:Fallback>
+  </mc:AlternateContent>
 </p:sld>
 </file>
 
@@ -15755,6 +15811,14 @@
   <p:clrMapOvr>
     <a:masterClrMapping/>
   </p:clrMapOvr>
+  <mc:AlternateContent xmlns:mc="http://schemas.openxmlformats.org/markup-compatibility/2006">
+    <mc:Choice xmlns:p14="http://schemas.microsoft.com/office/powerpoint/2010/main" Requires="p14">
+      <p:transition spd="slow" p14:dur="2000" advClick="0"/>
+    </mc:Choice>
+    <mc:Fallback>
+      <p:transition spd="slow" advClick="0"/>
+    </mc:Fallback>
+  </mc:AlternateContent>
 </p:sld>
 </file>
 
@@ -16088,6 +16152,14 @@
   <p:clrMapOvr>
     <a:masterClrMapping/>
   </p:clrMapOvr>
+  <mc:AlternateContent xmlns:mc="http://schemas.openxmlformats.org/markup-compatibility/2006">
+    <mc:Choice xmlns:p14="http://schemas.microsoft.com/office/powerpoint/2010/main" Requires="p14">
+      <p:transition spd="slow" p14:dur="2000" advClick="0"/>
+    </mc:Choice>
+    <mc:Fallback>
+      <p:transition spd="slow" advClick="0"/>
+    </mc:Fallback>
+  </mc:AlternateContent>
 </p:sld>
 </file>
 
@@ -16397,6 +16469,14 @@
   <p:clrMapOvr>
     <a:masterClrMapping/>
   </p:clrMapOvr>
+  <mc:AlternateContent xmlns:mc="http://schemas.openxmlformats.org/markup-compatibility/2006">
+    <mc:Choice xmlns:p14="http://schemas.microsoft.com/office/powerpoint/2010/main" Requires="p14">
+      <p:transition spd="slow" p14:dur="2000" advClick="0"/>
+    </mc:Choice>
+    <mc:Fallback>
+      <p:transition spd="slow" advClick="0"/>
+    </mc:Fallback>
+  </mc:AlternateContent>
 </p:sld>
 </file>
 
@@ -16667,6 +16747,14 @@
   <p:clrMapOvr>
     <a:masterClrMapping/>
   </p:clrMapOvr>
+  <mc:AlternateContent xmlns:mc="http://schemas.openxmlformats.org/markup-compatibility/2006">
+    <mc:Choice xmlns:p14="http://schemas.microsoft.com/office/powerpoint/2010/main" Requires="p14">
+      <p:transition spd="slow" p14:dur="2000" advClick="0"/>
+    </mc:Choice>
+    <mc:Fallback>
+      <p:transition spd="slow" advClick="0"/>
+    </mc:Fallback>
+  </mc:AlternateContent>
 </p:sld>
 </file>
 
@@ -16943,6 +17031,14 @@
   <p:clrMapOvr>
     <a:masterClrMapping/>
   </p:clrMapOvr>
+  <mc:AlternateContent xmlns:mc="http://schemas.openxmlformats.org/markup-compatibility/2006">
+    <mc:Choice xmlns:p14="http://schemas.microsoft.com/office/powerpoint/2010/main" Requires="p14">
+      <p:transition spd="slow" p14:dur="2000" advClick="0"/>
+    </mc:Choice>
+    <mc:Fallback>
+      <p:transition spd="slow" advClick="0"/>
+    </mc:Fallback>
+  </mc:AlternateContent>
 </p:sld>
 </file>
 
@@ -17219,6 +17315,14 @@
   <p:clrMapOvr>
     <a:masterClrMapping/>
   </p:clrMapOvr>
+  <mc:AlternateContent xmlns:mc="http://schemas.openxmlformats.org/markup-compatibility/2006">
+    <mc:Choice xmlns:p14="http://schemas.microsoft.com/office/powerpoint/2010/main" Requires="p14">
+      <p:transition spd="slow" p14:dur="2000" advClick="0"/>
+    </mc:Choice>
+    <mc:Fallback>
+      <p:transition spd="slow" advClick="0"/>
+    </mc:Fallback>
+  </mc:AlternateContent>
 </p:sld>
 </file>
 

</xml_diff>